<commit_message>
tweaks to DFS slides
</commit_message>
<xml_diff>
--- a/slides/graphs-dfs-f21.pptx
+++ b/slides/graphs-dfs-f21.pptx
@@ -247,7 +247,7 @@
           <a:p>
             <a:fld id="{9A9F7FD5-2840-4607-A4CD-0A8A66D9D61D}" type="datetimeFigureOut">
               <a:rPr lang="en-US" smtClean="0"/>
-              <a:t>8/31/21</a:t>
+              <a:t>9/21/21</a:t>
             </a:fld>
             <a:endParaRPr lang="en-US"/>
           </a:p>
@@ -772,7 +772,7 @@
           <a:p>
             <a:fld id="{088A2421-D2CD-4522-A1BA-E4F59ED821B7}" type="datetime1">
               <a:rPr lang="en-US" smtClean="0"/>
-              <a:t>8/31/21</a:t>
+              <a:t>9/21/21</a:t>
             </a:fld>
             <a:endParaRPr lang="en-US"/>
           </a:p>
@@ -1047,7 +1047,7 @@
           <a:p>
             <a:fld id="{DA91928D-0C55-4D8D-9D16-4C05754E5356}" type="datetime1">
               <a:rPr lang="en-US" smtClean="0"/>
-              <a:t>8/31/21</a:t>
+              <a:t>9/21/21</a:t>
             </a:fld>
             <a:endParaRPr lang="en-US"/>
           </a:p>
@@ -1302,7 +1302,7 @@
           <a:p>
             <a:fld id="{584CEDDD-253B-4C38-A621-35D8BA950C17}" type="datetime1">
               <a:rPr lang="en-US" smtClean="0"/>
-              <a:t>8/31/21</a:t>
+              <a:t>9/21/21</a:t>
             </a:fld>
             <a:endParaRPr lang="en-US"/>
           </a:p>
@@ -1470,7 +1470,7 @@
           <a:p>
             <a:fld id="{BF0967E4-28CB-45C9-B82C-D6B22AD4F0EB}" type="datetime1">
               <a:rPr lang="en-US" smtClean="0"/>
-              <a:t>8/31/21</a:t>
+              <a:t>9/21/21</a:t>
             </a:fld>
             <a:endParaRPr lang="en-US"/>
           </a:p>
@@ -1648,7 +1648,7 @@
           <a:p>
             <a:fld id="{2454C693-B405-44E1-A127-B7CE8B45C1E1}" type="datetime1">
               <a:rPr lang="en-US" smtClean="0"/>
-              <a:t>8/31/21</a:t>
+              <a:t>9/21/21</a:t>
             </a:fld>
             <a:endParaRPr lang="en-US"/>
           </a:p>
@@ -1900,7 +1900,7 @@
           <a:p>
             <a:fld id="{26B28102-2E91-4DD7-8E8B-98B790A12701}" type="datetime1">
               <a:rPr lang="en-US" smtClean="0"/>
-              <a:t>8/31/21</a:t>
+              <a:t>9/21/21</a:t>
             </a:fld>
             <a:endParaRPr lang="en-US"/>
           </a:p>
@@ -2158,7 +2158,7 @@
           <a:p>
             <a:fld id="{0B5AF985-6D44-417A-9881-D208468CBA07}" type="datetime1">
               <a:rPr lang="en-US" smtClean="0"/>
-              <a:t>8/31/21</a:t>
+              <a:t>9/21/21</a:t>
             </a:fld>
             <a:endParaRPr lang="en-US"/>
           </a:p>
@@ -2415,7 +2415,7 @@
           <a:p>
             <a:fld id="{26B28102-2E91-4DD7-8E8B-98B790A12701}" type="datetime1">
               <a:rPr lang="en-US" smtClean="0"/>
-              <a:t>8/31/21</a:t>
+              <a:t>9/21/21</a:t>
             </a:fld>
             <a:endParaRPr lang="en-US"/>
           </a:p>
@@ -2661,7 +2661,7 @@
           <a:p>
             <a:fld id="{3A604A86-E8D2-4E57-8D6D-61E2D175474B}" type="datetime1">
               <a:rPr lang="en-US" smtClean="0"/>
-              <a:t>8/31/21</a:t>
+              <a:t>9/21/21</a:t>
             </a:fld>
             <a:endParaRPr lang="en-US"/>
           </a:p>
@@ -3024,7 +3024,7 @@
           <a:p>
             <a:fld id="{DC921DF3-1FB0-45DC-97EF-461960E13574}" type="datetime1">
               <a:rPr lang="en-US" smtClean="0"/>
-              <a:t>8/31/21</a:t>
+              <a:t>9/21/21</a:t>
             </a:fld>
             <a:endParaRPr lang="en-US"/>
           </a:p>
@@ -3516,7 +3516,7 @@
           <a:p>
             <a:fld id="{092B088E-2809-46D8-B43F-738015D878CC}" type="datetime1">
               <a:rPr lang="en-US" smtClean="0"/>
-              <a:t>8/31/21</a:t>
+              <a:t>9/21/21</a:t>
             </a:fld>
             <a:endParaRPr lang="en-US"/>
           </a:p>
@@ -3711,7 +3711,7 @@
           <a:p>
             <a:fld id="{8208D42A-BC08-426E-9E11-483BA9D61AF6}" type="datetime1">
               <a:rPr lang="en-US" smtClean="0"/>
-              <a:t>8/31/21</a:t>
+              <a:t>9/21/21</a:t>
             </a:fld>
             <a:endParaRPr lang="en-US"/>
           </a:p>
@@ -3911,7 +3911,7 @@
           <a:p>
             <a:fld id="{26B28102-2E91-4DD7-8E8B-98B790A12701}" type="datetime1">
               <a:rPr lang="en-US" smtClean="0"/>
-              <a:t>8/31/21</a:t>
+              <a:t>9/21/21</a:t>
             </a:fld>
             <a:endParaRPr lang="en-US"/>
           </a:p>
@@ -4007,7 +4007,7 @@
           <a:p>
             <a:fld id="{37D5C786-44E1-4BD5-AD14-75F3EA166B5A}" type="datetime1">
               <a:rPr lang="en-US" smtClean="0"/>
-              <a:t>8/31/21</a:t>
+              <a:t>9/21/21</a:t>
             </a:fld>
             <a:endParaRPr lang="en-US"/>
           </a:p>
@@ -4218,7 +4218,7 @@
           <a:p>
             <a:fld id="{26B28102-2E91-4DD7-8E8B-98B790A12701}" type="datetime1">
               <a:rPr lang="en-US" smtClean="0"/>
-              <a:t>8/31/21</a:t>
+              <a:t>9/21/21</a:t>
             </a:fld>
             <a:endParaRPr lang="en-US"/>
           </a:p>
@@ -4644,7 +4644,7 @@
           <a:p>
             <a:r>
               <a:rPr lang="en-US" dirty="0"/>
-              <a:t>Spring 2021</a:t>
+              <a:t>Fall 2021</a:t>
             </a:r>
           </a:p>
           <a:p>
@@ -5149,7 +5149,7 @@
         </p:nvSpPr>
         <p:spPr bwMode="auto">
           <a:xfrm>
-            <a:off x="2362200" y="1165226"/>
+            <a:off x="2057400" y="1371600"/>
             <a:ext cx="7315200" cy="3540125"/>
           </a:xfrm>
           <a:prstGeom prst="rect">
@@ -5292,7 +5292,7 @@
           </a:lstStyle>
           <a:p>
             <a:r>
-              <a:rPr lang="en-US" altLang="en-US" sz="2800">
+              <a:rPr lang="en-US" altLang="en-US" sz="2800" dirty="0">
                 <a:latin typeface="Calibri" panose="020F0502020204030204" pitchFamily="34" charset="0"/>
               </a:rPr>
               <a:t>DFS(G)</a:t>
@@ -5300,7 +5300,7 @@
           </a:p>
           <a:p>
             <a:r>
-              <a:rPr lang="en-US" altLang="en-US" sz="2800">
+              <a:rPr lang="en-US" altLang="en-US" sz="2800" dirty="0">
                 <a:latin typeface="Calibri" panose="020F0502020204030204" pitchFamily="34" charset="0"/>
               </a:rPr>
               <a:t>1 for each vertex u in G.V</a:t>
@@ -5308,27 +5308,39 @@
           </a:p>
           <a:p>
             <a:r>
-              <a:rPr lang="en-US" altLang="en-US" sz="2800">
+              <a:rPr lang="en-US" altLang="en-US" sz="2800" dirty="0">
                 <a:latin typeface="Calibri" panose="020F0502020204030204" pitchFamily="34" charset="0"/>
               </a:rPr>
-              <a:t>2     u.color = WHITE</a:t>
-            </a:r>
-          </a:p>
-          <a:p>
-            <a:r>
-              <a:rPr lang="en-US" altLang="en-US" sz="2800">
+              <a:t>2     </a:t>
+            </a:r>
+            <a:r>
+              <a:rPr lang="en-US" altLang="en-US" sz="2800" dirty="0" err="1">
+                <a:latin typeface="Calibri" panose="020F0502020204030204" pitchFamily="34" charset="0"/>
+              </a:rPr>
+              <a:t>u.color</a:t>
+            </a:r>
+            <a:r>
+              <a:rPr lang="en-US" altLang="en-US" sz="2800" dirty="0">
+                <a:latin typeface="Calibri" panose="020F0502020204030204" pitchFamily="34" charset="0"/>
+              </a:rPr>
+              <a:t> = WHITE</a:t>
+            </a:r>
+          </a:p>
+          <a:p>
+            <a:r>
+              <a:rPr lang="en-US" altLang="en-US" sz="2800" dirty="0">
                 <a:latin typeface="Calibri" panose="020F0502020204030204" pitchFamily="34" charset="0"/>
               </a:rPr>
               <a:t>3     u.</a:t>
             </a:r>
             <a:r>
-              <a:rPr lang="el-GR" altLang="en-US" sz="2800">
+              <a:rPr lang="el-GR" altLang="en-US" sz="2800" dirty="0">
                 <a:latin typeface="Calibri" panose="020F0502020204030204" pitchFamily="34" charset="0"/>
               </a:rPr>
               <a:t>π</a:t>
             </a:r>
             <a:r>
-              <a:rPr lang="en-US" altLang="en-US" sz="2800">
+              <a:rPr lang="en-US" altLang="en-US" sz="2800" dirty="0">
                 <a:latin typeface="Calibri" panose="020F0502020204030204" pitchFamily="34" charset="0"/>
               </a:rPr>
               <a:t> = NIL</a:t>
@@ -5336,7 +5348,7 @@
           </a:p>
           <a:p>
             <a:r>
-              <a:rPr lang="en-US" altLang="en-US" sz="2800">
+              <a:rPr lang="en-US" altLang="en-US" sz="2800" dirty="0">
                 <a:latin typeface="Calibri" panose="020F0502020204030204" pitchFamily="34" charset="0"/>
               </a:rPr>
               <a:t>4 time = 0</a:t>
@@ -5344,7 +5356,7 @@
           </a:p>
           <a:p>
             <a:r>
-              <a:rPr lang="en-US" altLang="en-US" sz="2800">
+              <a:rPr lang="en-US" altLang="en-US" sz="2800" dirty="0">
                 <a:latin typeface="Calibri" panose="020F0502020204030204" pitchFamily="34" charset="0"/>
               </a:rPr>
               <a:t>5 for each vertex u in G.V</a:t>
@@ -5352,18 +5364,93 @@
           </a:p>
           <a:p>
             <a:r>
-              <a:rPr lang="en-US" altLang="en-US" sz="2800">
+              <a:rPr lang="en-US" altLang="en-US" sz="2800" dirty="0">
                 <a:latin typeface="Calibri" panose="020F0502020204030204" pitchFamily="34" charset="0"/>
               </a:rPr>
-              <a:t>6     if u.color == WHITE  // if unseen</a:t>
-            </a:r>
-          </a:p>
-          <a:p>
-            <a:r>
-              <a:rPr lang="en-US" altLang="en-US" sz="2800">
+              <a:t>6     if </a:t>
+            </a:r>
+            <a:r>
+              <a:rPr lang="en-US" altLang="en-US" sz="2800" dirty="0" err="1">
+                <a:latin typeface="Calibri" panose="020F0502020204030204" pitchFamily="34" charset="0"/>
+              </a:rPr>
+              <a:t>u.color</a:t>
+            </a:r>
+            <a:r>
+              <a:rPr lang="en-US" altLang="en-US" sz="2800" dirty="0">
+                <a:latin typeface="Calibri" panose="020F0502020204030204" pitchFamily="34" charset="0"/>
+              </a:rPr>
+              <a:t> == WHITE  // if unseen</a:t>
+            </a:r>
+          </a:p>
+          <a:p>
+            <a:r>
+              <a:rPr lang="en-US" altLang="en-US" sz="2800" dirty="0">
                 <a:latin typeface="Calibri" panose="020F0502020204030204" pitchFamily="34" charset="0"/>
               </a:rPr>
               <a:t>7         DFS-VISIT(G, u)  // explore paths out of u</a:t>
+            </a:r>
+          </a:p>
+        </p:txBody>
+      </p:sp>
+      <p:sp>
+        <p:nvSpPr>
+          <p:cNvPr id="2" name="TextBox 1">
+            <a:extLst>
+              <a:ext uri="{FF2B5EF4-FFF2-40B4-BE49-F238E27FC236}">
+                <a16:creationId xmlns:a16="http://schemas.microsoft.com/office/drawing/2014/main" id="{56C90026-BAA3-0F47-BF5E-A3FB730C353B}"/>
+              </a:ext>
+            </a:extLst>
+          </p:cNvPr>
+          <p:cNvSpPr txBox="1"/>
+          <p:nvPr/>
+        </p:nvSpPr>
+        <p:spPr>
+          <a:xfrm>
+            <a:off x="3370574" y="1371600"/>
+            <a:ext cx="5607432" cy="523220"/>
+          </a:xfrm>
+          <a:prstGeom prst="rect">
+            <a:avLst/>
+          </a:prstGeom>
+          <a:noFill/>
+        </p:spPr>
+        <p:txBody>
+          <a:bodyPr wrap="none" rtlCol="0">
+            <a:spAutoFit/>
+          </a:bodyPr>
+          <a:lstStyle/>
+          <a:p>
+            <a:r>
+              <a:rPr lang="en-US" sz="2800" b="1" dirty="0">
+                <a:solidFill>
+                  <a:srgbClr val="0070C0"/>
+                </a:solidFill>
+              </a:rPr>
+              <a:t>// we called this </a:t>
+            </a:r>
+            <a:r>
+              <a:rPr lang="en-US" sz="2800" b="1" dirty="0" err="1">
+                <a:solidFill>
+                  <a:srgbClr val="0070C0"/>
+                </a:solidFill>
+              </a:rPr>
+              <a:t>dfs_sweep</a:t>
+            </a:r>
+            <a:r>
+              <a:rPr lang="en-US" sz="2800" b="1" dirty="0">
+                <a:solidFill>
+                  <a:srgbClr val="0070C0"/>
+                </a:solidFill>
+              </a:rPr>
+              <a:t>() earlier</a:t>
+            </a:r>
+            <a:r>
+              <a:rPr lang="en-US" b="1" dirty="0">
+                <a:solidFill>
+                  <a:srgbClr val="0070C0"/>
+                </a:solidFill>
+              </a:rPr>
+              <a:t> </a:t>
             </a:r>
           </a:p>
         </p:txBody>
@@ -5588,7 +5675,7 @@
           </a:lstStyle>
           <a:p>
             <a:r>
-              <a:rPr lang="en-US" altLang="en-US">
+              <a:rPr lang="en-US" altLang="en-US" dirty="0">
                 <a:latin typeface="Calibri" panose="020F0502020204030204" pitchFamily="34" charset="0"/>
               </a:rPr>
               <a:t>DFS-VISIT(G, u)</a:t>
@@ -5596,7 +5683,7 @@
           </a:p>
           <a:p>
             <a:r>
-              <a:rPr lang="en-US" altLang="en-US">
+              <a:rPr lang="en-US" altLang="en-US" dirty="0">
                 <a:latin typeface="Calibri" panose="020F0502020204030204" pitchFamily="34" charset="0"/>
               </a:rPr>
               <a:t>1   time = time + 1  // white vertex u has just been discovered</a:t>
@@ -5604,51 +5691,99 @@
           </a:p>
           <a:p>
             <a:r>
-              <a:rPr lang="en-US" altLang="en-US">
+              <a:rPr lang="en-US" altLang="en-US" dirty="0">
                 <a:latin typeface="Calibri" panose="020F0502020204030204" pitchFamily="34" charset="0"/>
               </a:rPr>
-              <a:t>2   u.d = time  // discovery time of u</a:t>
-            </a:r>
-          </a:p>
-          <a:p>
-            <a:r>
-              <a:rPr lang="en-US" altLang="en-US">
+              <a:t>2   </a:t>
+            </a:r>
+            <a:r>
+              <a:rPr lang="en-US" altLang="en-US" dirty="0" err="1">
                 <a:latin typeface="Calibri" panose="020F0502020204030204" pitchFamily="34" charset="0"/>
               </a:rPr>
-              <a:t>3   u.color = GRAY  // mark as seen</a:t>
-            </a:r>
-          </a:p>
-          <a:p>
-            <a:r>
-              <a:rPr lang="en-US" altLang="en-US">
+              <a:t>u.d</a:t>
+            </a:r>
+            <a:r>
+              <a:rPr lang="en-US" altLang="en-US" dirty="0">
                 <a:latin typeface="Calibri" panose="020F0502020204030204" pitchFamily="34" charset="0"/>
               </a:rPr>
-              <a:t>4   for each v in G.Adj[u]  // explore edge (u, v)</a:t>
-            </a:r>
-          </a:p>
-          <a:p>
-            <a:r>
-              <a:rPr lang="en-US" altLang="en-US">
+              <a:t> = time  // discovery time of u</a:t>
+            </a:r>
+          </a:p>
+          <a:p>
+            <a:r>
+              <a:rPr lang="en-US" altLang="en-US" dirty="0">
                 <a:latin typeface="Calibri" panose="020F0502020204030204" pitchFamily="34" charset="0"/>
               </a:rPr>
-              <a:t>5       if v.color == WHITE   // if unseen</a:t>
-            </a:r>
-          </a:p>
-          <a:p>
-            <a:r>
-              <a:rPr lang="en-US" altLang="en-US">
+              <a:t>3   </a:t>
+            </a:r>
+            <a:r>
+              <a:rPr lang="en-US" altLang="en-US" dirty="0" err="1">
+                <a:latin typeface="Calibri" panose="020F0502020204030204" pitchFamily="34" charset="0"/>
+              </a:rPr>
+              <a:t>u.color</a:t>
+            </a:r>
+            <a:r>
+              <a:rPr lang="en-US" altLang="en-US" dirty="0">
+                <a:latin typeface="Calibri" panose="020F0502020204030204" pitchFamily="34" charset="0"/>
+              </a:rPr>
+              <a:t> = GRAY  // mark as seen</a:t>
+            </a:r>
+          </a:p>
+          <a:p>
+            <a:r>
+              <a:rPr lang="en-US" altLang="en-US" dirty="0">
+                <a:latin typeface="Calibri" panose="020F0502020204030204" pitchFamily="34" charset="0"/>
+              </a:rPr>
+              <a:t>4   for each v in </a:t>
+            </a:r>
+            <a:r>
+              <a:rPr lang="en-US" altLang="en-US" dirty="0" err="1">
+                <a:latin typeface="Calibri" panose="020F0502020204030204" pitchFamily="34" charset="0"/>
+              </a:rPr>
+              <a:t>G.Adj</a:t>
+            </a:r>
+            <a:r>
+              <a:rPr lang="en-US" altLang="en-US" dirty="0">
+                <a:latin typeface="Calibri" panose="020F0502020204030204" pitchFamily="34" charset="0"/>
+              </a:rPr>
+              <a:t>[u]  // explore edge (u, v)</a:t>
+            </a:r>
+          </a:p>
+          <a:p>
+            <a:r>
+              <a:rPr lang="en-US" altLang="en-US" dirty="0">
+                <a:latin typeface="Calibri" panose="020F0502020204030204" pitchFamily="34" charset="0"/>
+              </a:rPr>
+              <a:t>5       if </a:t>
+            </a:r>
+            <a:r>
+              <a:rPr lang="en-US" altLang="en-US" dirty="0" err="1">
+                <a:latin typeface="Calibri" panose="020F0502020204030204" pitchFamily="34" charset="0"/>
+              </a:rPr>
+              <a:t>v.color</a:t>
+            </a:r>
+            <a:r>
+              <a:rPr lang="en-US" altLang="en-US" dirty="0">
+                <a:latin typeface="Calibri" panose="020F0502020204030204" pitchFamily="34" charset="0"/>
+              </a:rPr>
+              <a:t> == WHITE   // if unseen</a:t>
+            </a:r>
+          </a:p>
+          <a:p>
+            <a:r>
+              <a:rPr lang="en-US" altLang="en-US" dirty="0">
                 <a:latin typeface="Calibri" panose="020F0502020204030204" pitchFamily="34" charset="0"/>
               </a:rPr>
               <a:t>6           v.</a:t>
             </a:r>
             <a:r>
-              <a:rPr lang="el-GR" altLang="en-US">
+              <a:rPr lang="el-GR" altLang="en-US" dirty="0">
                 <a:latin typeface="Calibri" panose="020F0502020204030204" pitchFamily="34" charset="0"/>
               </a:rPr>
               <a:t>π</a:t>
             </a:r>
             <a:r>
-              <a:rPr lang="en-US" altLang="en-US">
+              <a:rPr lang="en-US" altLang="en-US" dirty="0">
                 <a:latin typeface="Calibri" panose="020F0502020204030204" pitchFamily="34" charset="0"/>
               </a:rPr>
               <a:t> = u</a:t>
@@ -5656,7 +5791,7 @@
           </a:p>
           <a:p>
             <a:r>
-              <a:rPr lang="en-US" altLang="en-US">
+              <a:rPr lang="en-US" altLang="en-US" dirty="0">
                 <a:latin typeface="Calibri" panose="020F0502020204030204" pitchFamily="34" charset="0"/>
               </a:rPr>
               <a:t>7           DFS-VISIT(G, v)  // explore paths out of v (i.e., go </a:t>
@@ -5668,7 +5803,7 @@
               <a:t>“</a:t>
             </a:r>
             <a:r>
-              <a:rPr lang="en-US" altLang="ja-JP">
+              <a:rPr lang="en-US" altLang="ja-JP" dirty="0">
                 <a:latin typeface="Calibri" panose="020F0502020204030204" pitchFamily="34" charset="0"/>
               </a:rPr>
               <a:t>deeper</a:t>
@@ -5680,7 +5815,7 @@
               <a:t>”</a:t>
             </a:r>
             <a:r>
-              <a:rPr lang="en-US" altLang="ja-JP">
+              <a:rPr lang="en-US" altLang="ja-JP" dirty="0">
                 <a:latin typeface="Calibri" panose="020F0502020204030204" pitchFamily="34" charset="0"/>
               </a:rPr>
               <a:t>)</a:t>
@@ -5688,15 +5823,27 @@
           </a:p>
           <a:p>
             <a:r>
-              <a:rPr lang="en-US" altLang="en-US">
+              <a:rPr lang="en-US" altLang="en-US" dirty="0">
                 <a:latin typeface="Calibri" panose="020F0502020204030204" pitchFamily="34" charset="0"/>
               </a:rPr>
-              <a:t>8   u.color = BLACK  // u is finished</a:t>
-            </a:r>
-          </a:p>
-          <a:p>
-            <a:r>
-              <a:rPr lang="en-US" altLang="en-US">
+              <a:t>8   </a:t>
+            </a:r>
+            <a:r>
+              <a:rPr lang="en-US" altLang="en-US" dirty="0" err="1">
+                <a:latin typeface="Calibri" panose="020F0502020204030204" pitchFamily="34" charset="0"/>
+              </a:rPr>
+              <a:t>u.color</a:t>
+            </a:r>
+            <a:r>
+              <a:rPr lang="en-US" altLang="en-US" dirty="0">
+                <a:latin typeface="Calibri" panose="020F0502020204030204" pitchFamily="34" charset="0"/>
+              </a:rPr>
+              <a:t> = BLACK  // u is finished</a:t>
+            </a:r>
+          </a:p>
+          <a:p>
+            <a:r>
+              <a:rPr lang="en-US" altLang="en-US" dirty="0">
                 <a:latin typeface="Calibri" panose="020F0502020204030204" pitchFamily="34" charset="0"/>
               </a:rPr>
               <a:t>9   time = time + 1</a:t>
@@ -5704,10 +5851,77 @@
           </a:p>
           <a:p>
             <a:r>
-              <a:rPr lang="en-US" altLang="en-US">
+              <a:rPr lang="en-US" altLang="en-US" dirty="0">
                 <a:latin typeface="Calibri" panose="020F0502020204030204" pitchFamily="34" charset="0"/>
               </a:rPr>
-              <a:t>10 u.f = time  // finish time of u</a:t>
+              <a:t>10 </a:t>
+            </a:r>
+            <a:r>
+              <a:rPr lang="en-US" altLang="en-US" dirty="0" err="1">
+                <a:latin typeface="Calibri" panose="020F0502020204030204" pitchFamily="34" charset="0"/>
+              </a:rPr>
+              <a:t>u.f</a:t>
+            </a:r>
+            <a:r>
+              <a:rPr lang="en-US" altLang="en-US" dirty="0">
+                <a:latin typeface="Calibri" panose="020F0502020204030204" pitchFamily="34" charset="0"/>
+              </a:rPr>
+              <a:t> = time  // finish time of u</a:t>
+            </a:r>
+          </a:p>
+        </p:txBody>
+      </p:sp>
+      <p:sp>
+        <p:nvSpPr>
+          <p:cNvPr id="4" name="TextBox 3">
+            <a:extLst>
+              <a:ext uri="{FF2B5EF4-FFF2-40B4-BE49-F238E27FC236}">
+                <a16:creationId xmlns:a16="http://schemas.microsoft.com/office/drawing/2014/main" id="{640DB1D1-C64A-DE40-90BD-BE7132627538}"/>
+              </a:ext>
+            </a:extLst>
+          </p:cNvPr>
+          <p:cNvSpPr txBox="1"/>
+          <p:nvPr/>
+        </p:nvSpPr>
+        <p:spPr>
+          <a:xfrm>
+            <a:off x="4114800" y="1198803"/>
+            <a:ext cx="4967963" cy="461665"/>
+          </a:xfrm>
+          <a:prstGeom prst="rect">
+            <a:avLst/>
+          </a:prstGeom>
+          <a:noFill/>
+        </p:spPr>
+        <p:txBody>
+          <a:bodyPr wrap="none" rtlCol="0">
+            <a:spAutoFit/>
+          </a:bodyPr>
+          <a:lstStyle/>
+          <a:p>
+            <a:r>
+              <a:rPr lang="en-US" sz="2400" b="1" dirty="0">
+                <a:solidFill>
+                  <a:srgbClr val="0070C0"/>
+                </a:solidFill>
+              </a:rPr>
+              <a:t>// we called this </a:t>
+            </a:r>
+            <a:r>
+              <a:rPr lang="en-US" sz="2400" b="1" dirty="0" err="1">
+                <a:solidFill>
+                  <a:srgbClr val="0070C0"/>
+                </a:solidFill>
+              </a:rPr>
+              <a:t>dfs_recurse</a:t>
+            </a:r>
+            <a:r>
+              <a:rPr lang="en-US" sz="2400" b="1" dirty="0">
+                <a:solidFill>
+                  <a:srgbClr val="0070C0"/>
+                </a:solidFill>
+              </a:rPr>
+              <a:t>() earlier </a:t>
             </a:r>
           </a:p>
         </p:txBody>
@@ -5804,7 +6018,12 @@
             </p:custDataLst>
           </p:nvPr>
         </p:nvSpPr>
-        <p:spPr/>
+        <p:spPr>
+          <a:xfrm>
+            <a:off x="590309" y="1371600"/>
+            <a:ext cx="10972800" cy="4525963"/>
+          </a:xfrm>
+        </p:spPr>
         <p:txBody>
           <a:bodyPr/>
           <a:lstStyle/>
@@ -5827,6 +6046,30 @@
               <a:rPr lang="en-US" dirty="0"/>
               <a:t>If graph undirected, do we have all 4 types?</a:t>
             </a:r>
+          </a:p>
+          <a:p>
+            <a:pPr lvl="1"/>
+            <a:endParaRPr lang="en-US" dirty="0"/>
+          </a:p>
+          <a:p>
+            <a:pPr lvl="1"/>
+            <a:endParaRPr lang="en-US" dirty="0"/>
+          </a:p>
+          <a:p>
+            <a:pPr lvl="1"/>
+            <a:endParaRPr lang="en-US" dirty="0"/>
+          </a:p>
+          <a:p>
+            <a:pPr lvl="1"/>
+            <a:endParaRPr lang="en-US" dirty="0"/>
+          </a:p>
+          <a:p>
+            <a:pPr lvl="1"/>
+            <a:endParaRPr lang="en-US" dirty="0"/>
+          </a:p>
+          <a:p>
+            <a:pPr lvl="1"/>
+            <a:endParaRPr lang="en-US" dirty="0"/>
           </a:p>
         </p:txBody>
       </p:sp>
@@ -5852,7 +6095,7 @@
         </p:blipFill>
         <p:spPr>
           <a:xfrm>
-            <a:off x="3124200" y="2640183"/>
+            <a:off x="1092201" y="3104359"/>
             <a:ext cx="4724400" cy="3601241"/>
           </a:xfrm>
           <a:prstGeom prst="rect">
@@ -6411,7 +6654,7 @@
             </a:pPr>
             <a:r>
               <a:rPr lang="en-US" dirty="0"/>
-              <a:t>The </a:t>
+              <a:t>The non-recursive </a:t>
             </a:r>
             <a:r>
               <a:rPr lang="en-US" dirty="0" err="1"/>
@@ -6728,9 +6971,20 @@
         <p:spPr/>
         <p:txBody>
           <a:bodyPr rtlCol="0">
-            <a:normAutofit fontScale="92500" lnSpcReduction="20000"/>
+            <a:normAutofit/>
           </a:bodyPr>
           <a:lstStyle/>
+          <a:p>
+            <a:pPr>
+              <a:defRPr/>
+            </a:pPr>
+            <a:r>
+              <a:rPr lang="en-US" dirty="0">
+                <a:ea typeface="+mn-ea"/>
+              </a:rPr>
+              <a:t>Source vertex: 1</a:t>
+            </a:r>
+          </a:p>
           <a:p>
             <a:pPr>
               <a:defRPr/>
@@ -6738,6 +6992,12 @@
             <a:endParaRPr lang="en-US" dirty="0">
               <a:ea typeface="+mn-ea"/>
             </a:endParaRPr>
+          </a:p>
+          <a:p>
+            <a:pPr>
+              <a:defRPr/>
+            </a:pPr>
+            <a:endParaRPr lang="en-US" dirty="0"/>
           </a:p>
           <a:p>
             <a:pPr marL="0" indent="0">
@@ -6752,20 +7012,18 @@
             <a:pPr>
               <a:defRPr/>
             </a:pPr>
-            <a:endParaRPr lang="en-US" dirty="0">
-              <a:ea typeface="+mn-ea"/>
-            </a:endParaRPr>
+            <a:r>
+              <a:rPr lang="en-US" dirty="0">
+                <a:ea typeface="+mn-ea"/>
+              </a:rPr>
+              <a:t>Source vertex: s</a:t>
+            </a:r>
           </a:p>
           <a:p>
             <a:pPr>
               <a:defRPr/>
             </a:pPr>
-            <a:r>
-              <a:rPr lang="en-US" dirty="0">
-                <a:ea typeface="+mn-ea"/>
-              </a:rPr>
-              <a:t>Source vertex: 1</a:t>
-            </a:r>
+            <a:endParaRPr lang="en-US" dirty="0"/>
           </a:p>
           <a:p>
             <a:pPr>
@@ -6774,41 +7032,6 @@
             <a:endParaRPr lang="en-US" dirty="0">
               <a:ea typeface="+mn-ea"/>
             </a:endParaRPr>
-          </a:p>
-          <a:p>
-            <a:pPr>
-              <a:defRPr/>
-            </a:pPr>
-            <a:endParaRPr lang="en-US" dirty="0">
-              <a:ea typeface="+mn-ea"/>
-            </a:endParaRPr>
-          </a:p>
-          <a:p>
-            <a:pPr>
-              <a:defRPr/>
-            </a:pPr>
-            <a:endParaRPr lang="en-US" dirty="0">
-              <a:ea typeface="+mn-ea"/>
-            </a:endParaRPr>
-          </a:p>
-          <a:p>
-            <a:pPr>
-              <a:defRPr/>
-            </a:pPr>
-            <a:endParaRPr lang="en-US" dirty="0">
-              <a:ea typeface="+mn-ea"/>
-            </a:endParaRPr>
-          </a:p>
-          <a:p>
-            <a:pPr>
-              <a:defRPr/>
-            </a:pPr>
-            <a:r>
-              <a:rPr lang="en-US" dirty="0">
-                <a:ea typeface="+mn-ea"/>
-              </a:rPr>
-              <a:t>Source vertex: s</a:t>
-            </a:r>
           </a:p>
         </p:txBody>
       </p:sp>
@@ -6841,7 +7064,7 @@
         </p:blipFill>
         <p:spPr bwMode="auto">
           <a:xfrm>
-            <a:off x="2057400" y="3429001"/>
+            <a:off x="914400" y="4737884"/>
             <a:ext cx="3962400" cy="1681163"/>
           </a:xfrm>
           <a:prstGeom prst="rect">
@@ -6901,7 +7124,7 @@
         </p:blipFill>
         <p:spPr bwMode="auto">
           <a:xfrm>
-            <a:off x="2362200" y="1143000"/>
+            <a:off x="1066800" y="2362200"/>
             <a:ext cx="2667000" cy="1627188"/>
           </a:xfrm>
           <a:prstGeom prst="rect">
@@ -10550,14 +10773,14 @@
           </a:ln>
           <a:extLst>
             <a:ext uri="{909E8E84-426E-40dd-AFC4-6F175D3DCCD1}">
-              <a14:hiddenFill xmlns="" xmlns:a14="http://schemas.microsoft.com/office/drawing/2010/main">
+              <a14:hiddenFill xmlns:a14="http://schemas.microsoft.com/office/drawing/2010/main" xmlns="">
                 <a:solidFill>
                   <a:srgbClr val="FFFFFF"/>
                 </a:solidFill>
               </a14:hiddenFill>
             </a:ext>
             <a:ext uri="{91240B29-F687-4f45-9708-019B960494DF}">
-              <a14:hiddenLine xmlns="" xmlns:a14="http://schemas.microsoft.com/office/drawing/2010/main" w="9525">
+              <a14:hiddenLine xmlns:a14="http://schemas.microsoft.com/office/drawing/2010/main" xmlns="" w="9525">
                 <a:solidFill>
                   <a:srgbClr val="000000"/>
                 </a:solidFill>
@@ -16106,7 +16329,7 @@
         <p:spPr/>
         <p:txBody>
           <a:bodyPr>
-            <a:normAutofit fontScale="92500" lnSpcReduction="10000"/>
+            <a:normAutofit fontScale="92500" lnSpcReduction="20000"/>
           </a:bodyPr>
           <a:lstStyle/>
           <a:p>
@@ -16148,6 +16371,13 @@
             <a:r>
               <a:rPr lang="en-US" dirty="0"/>
               <a:t>We often add things to DFS code to solve problems</a:t>
+            </a:r>
+          </a:p>
+          <a:p>
+            <a:pPr lvl="2"/>
+            <a:r>
+              <a:rPr lang="en-US" dirty="0"/>
+              <a:t>Code shown next is very minimal</a:t>
             </a:r>
           </a:p>
           <a:p>
@@ -16380,9 +16610,16 @@
               <a:rPr lang="en-US" sz="2000" dirty="0"/>
               <a:t>] = True</a:t>
             </a:r>
-            <a:br>
+          </a:p>
+          <a:p>
+            <a:pPr algn="l">
+              <a:buFontTx/>
+              <a:buNone/>
+            </a:pPr>
+            <a:r>
               <a:rPr lang="en-US" sz="2000" dirty="0"/>
-            </a:br>
+              <a:t>    </a:t>
+            </a:r>
             <a:r>
               <a:rPr lang="en-US" sz="2000" dirty="0" err="1"/>
               <a:t>alist</a:t>
@@ -16448,7 +16685,7 @@
             </a:pPr>
             <a:r>
               <a:rPr lang="en-US" sz="2000" dirty="0"/>
-              <a:t>            print "  </a:t>
+              <a:t>            print("  </a:t>
             </a:r>
             <a:r>
               <a:rPr lang="en-US" sz="2000" dirty="0" err="1"/>
@@ -16464,7 +16701,7 @@
             </a:r>
             <a:r>
               <a:rPr lang="en-US" sz="2000" dirty="0"/>
-              <a:t>, v</a:t>
+              <a:t>, v)</a:t>
             </a:r>
           </a:p>
           <a:p>

</xml_diff>